<commit_message>
labeling Milestone 3 + erster kritikpunkt von Julia (Boxplot ohne Färbung)
</commit_message>
<xml_diff>
--- a/All_Results.pptx
+++ b/All_Results.pptx
@@ -271,7 +271,7 @@
           <a:p>
             <a:fld id="{3AB65DCB-53B3-4C5F-B8F0-D97C6F748A08}" type="datetimeFigureOut">
               <a:rPr lang="de-DE" smtClean="0"/>
-              <a:t>06.06.2019</a:t>
+              <a:t>12.06.2019</a:t>
             </a:fld>
             <a:endParaRPr lang="de-DE"/>
           </a:p>
@@ -469,7 +469,7 @@
           <a:p>
             <a:fld id="{3AB65DCB-53B3-4C5F-B8F0-D97C6F748A08}" type="datetimeFigureOut">
               <a:rPr lang="de-DE" smtClean="0"/>
-              <a:t>06.06.2019</a:t>
+              <a:t>12.06.2019</a:t>
             </a:fld>
             <a:endParaRPr lang="de-DE"/>
           </a:p>
@@ -677,7 +677,7 @@
           <a:p>
             <a:fld id="{3AB65DCB-53B3-4C5F-B8F0-D97C6F748A08}" type="datetimeFigureOut">
               <a:rPr lang="de-DE" smtClean="0"/>
-              <a:t>06.06.2019</a:t>
+              <a:t>12.06.2019</a:t>
             </a:fld>
             <a:endParaRPr lang="de-DE"/>
           </a:p>
@@ -875,7 +875,7 @@
           <a:p>
             <a:fld id="{3AB65DCB-53B3-4C5F-B8F0-D97C6F748A08}" type="datetimeFigureOut">
               <a:rPr lang="de-DE" smtClean="0"/>
-              <a:t>06.06.2019</a:t>
+              <a:t>12.06.2019</a:t>
             </a:fld>
             <a:endParaRPr lang="de-DE"/>
           </a:p>
@@ -1150,7 +1150,7 @@
           <a:p>
             <a:fld id="{3AB65DCB-53B3-4C5F-B8F0-D97C6F748A08}" type="datetimeFigureOut">
               <a:rPr lang="de-DE" smtClean="0"/>
-              <a:t>06.06.2019</a:t>
+              <a:t>12.06.2019</a:t>
             </a:fld>
             <a:endParaRPr lang="de-DE"/>
           </a:p>
@@ -1415,7 +1415,7 @@
           <a:p>
             <a:fld id="{3AB65DCB-53B3-4C5F-B8F0-D97C6F748A08}" type="datetimeFigureOut">
               <a:rPr lang="de-DE" smtClean="0"/>
-              <a:t>06.06.2019</a:t>
+              <a:t>12.06.2019</a:t>
             </a:fld>
             <a:endParaRPr lang="de-DE"/>
           </a:p>
@@ -1827,7 +1827,7 @@
           <a:p>
             <a:fld id="{3AB65DCB-53B3-4C5F-B8F0-D97C6F748A08}" type="datetimeFigureOut">
               <a:rPr lang="de-DE" smtClean="0"/>
-              <a:t>06.06.2019</a:t>
+              <a:t>12.06.2019</a:t>
             </a:fld>
             <a:endParaRPr lang="de-DE"/>
           </a:p>
@@ -1968,7 +1968,7 @@
           <a:p>
             <a:fld id="{3AB65DCB-53B3-4C5F-B8F0-D97C6F748A08}" type="datetimeFigureOut">
               <a:rPr lang="de-DE" smtClean="0"/>
-              <a:t>06.06.2019</a:t>
+              <a:t>12.06.2019</a:t>
             </a:fld>
             <a:endParaRPr lang="de-DE"/>
           </a:p>
@@ -2081,7 +2081,7 @@
           <a:p>
             <a:fld id="{3AB65DCB-53B3-4C5F-B8F0-D97C6F748A08}" type="datetimeFigureOut">
               <a:rPr lang="de-DE" smtClean="0"/>
-              <a:t>06.06.2019</a:t>
+              <a:t>12.06.2019</a:t>
             </a:fld>
             <a:endParaRPr lang="de-DE"/>
           </a:p>
@@ -2392,7 +2392,7 @@
           <a:p>
             <a:fld id="{3AB65DCB-53B3-4C5F-B8F0-D97C6F748A08}" type="datetimeFigureOut">
               <a:rPr lang="de-DE" smtClean="0"/>
-              <a:t>06.06.2019</a:t>
+              <a:t>12.06.2019</a:t>
             </a:fld>
             <a:endParaRPr lang="de-DE"/>
           </a:p>
@@ -2680,7 +2680,7 @@
           <a:p>
             <a:fld id="{3AB65DCB-53B3-4C5F-B8F0-D97C6F748A08}" type="datetimeFigureOut">
               <a:rPr lang="de-DE" smtClean="0"/>
-              <a:t>06.06.2019</a:t>
+              <a:t>12.06.2019</a:t>
             </a:fld>
             <a:endParaRPr lang="de-DE"/>
           </a:p>
@@ -2921,7 +2921,7 @@
           <a:p>
             <a:fld id="{3AB65DCB-53B3-4C5F-B8F0-D97C6F748A08}" type="datetimeFigureOut">
               <a:rPr lang="de-DE" smtClean="0"/>
-              <a:t>06.06.2019</a:t>
+              <a:t>12.06.2019</a:t>
             </a:fld>
             <a:endParaRPr lang="de-DE"/>
           </a:p>
@@ -3661,7 +3661,7 @@
         </p:blipFill>
         <p:spPr>
           <a:xfrm>
-            <a:off x="665824" y="3231472"/>
+            <a:off x="3771704" y="3564968"/>
             <a:ext cx="6211761" cy="3479520"/>
           </a:xfrm>
           <a:prstGeom prst="rect">
@@ -3900,6 +3900,107 @@
           </a:p>
         </p:txBody>
       </p:sp>
+      <p:pic>
+        <p:nvPicPr>
+          <p:cNvPr id="11" name="Grafik 10">
+            <a:extLst>
+              <a:ext uri="{FF2B5EF4-FFF2-40B4-BE49-F238E27FC236}">
+                <a16:creationId xmlns:a16="http://schemas.microsoft.com/office/drawing/2014/main" id="{F9174825-F015-44D4-9D45-AFBB187D2F07}"/>
+              </a:ext>
+            </a:extLst>
+          </p:cNvPr>
+          <p:cNvPicPr>
+            <a:picLocks noChangeAspect="1"/>
+          </p:cNvPicPr>
+          <p:nvPr/>
+        </p:nvPicPr>
+        <p:blipFill>
+          <a:blip r:embed="rId3"/>
+          <a:stretch>
+            <a:fillRect/>
+          </a:stretch>
+        </p:blipFill>
+        <p:spPr>
+          <a:xfrm>
+            <a:off x="7797035" y="365125"/>
+            <a:ext cx="4372860" cy="3413972"/>
+          </a:xfrm>
+          <a:prstGeom prst="rect">
+            <a:avLst/>
+          </a:prstGeom>
+        </p:spPr>
+      </p:pic>
+      <p:sp>
+        <p:nvSpPr>
+          <p:cNvPr id="12" name="Textfeld 11">
+            <a:extLst>
+              <a:ext uri="{FF2B5EF4-FFF2-40B4-BE49-F238E27FC236}">
+                <a16:creationId xmlns:a16="http://schemas.microsoft.com/office/drawing/2014/main" id="{0C86FDD5-6A1F-4D90-A7C2-E09B0D4197CC}"/>
+              </a:ext>
+            </a:extLst>
+          </p:cNvPr>
+          <p:cNvSpPr txBox="1"/>
+          <p:nvPr/>
+        </p:nvSpPr>
+        <p:spPr>
+          <a:xfrm>
+            <a:off x="6391548" y="2912576"/>
+            <a:ext cx="1651247" cy="369332"/>
+          </a:xfrm>
+          <a:prstGeom prst="rect">
+            <a:avLst/>
+          </a:prstGeom>
+          <a:noFill/>
+        </p:spPr>
+        <p:txBody>
+          <a:bodyPr wrap="square" rtlCol="0">
+            <a:spAutoFit/>
+          </a:bodyPr>
+          <a:lstStyle/>
+          <a:p>
+            <a:r>
+              <a:rPr lang="de-DE" dirty="0" err="1"/>
+              <a:t>Normalization</a:t>
+            </a:r>
+            <a:endParaRPr lang="de-DE" dirty="0"/>
+          </a:p>
+        </p:txBody>
+      </p:sp>
+      <p:pic>
+        <p:nvPicPr>
+          <p:cNvPr id="3" name="Grafik 2" descr="Ein Bild, das Screenshot enthält.&#10;&#10;Automatisch generierte Beschreibung">
+            <a:extLst>
+              <a:ext uri="{FF2B5EF4-FFF2-40B4-BE49-F238E27FC236}">
+                <a16:creationId xmlns:a16="http://schemas.microsoft.com/office/drawing/2014/main" id="{C3560E4F-4D2C-4AE0-9B95-DDADAC6BA9CA}"/>
+              </a:ext>
+            </a:extLst>
+          </p:cNvPr>
+          <p:cNvPicPr>
+            <a:picLocks noChangeAspect="1"/>
+          </p:cNvPicPr>
+          <p:nvPr/>
+        </p:nvPicPr>
+        <p:blipFill rotWithShape="1">
+          <a:blip r:embed="rId4">
+            <a:extLst>
+              <a:ext uri="{28A0092B-C50C-407E-A947-70E740481C1C}">
+                <a14:useLocalDpi xmlns:a14="http://schemas.microsoft.com/office/drawing/2010/main" val="0"/>
+              </a:ext>
+            </a:extLst>
+          </a:blip>
+          <a:srcRect r="19814" b="11122"/>
+          <a:stretch/>
+        </p:blipFill>
+        <p:spPr>
+          <a:xfrm>
+            <a:off x="82289" y="2747412"/>
+            <a:ext cx="3582326" cy="2460786"/>
+          </a:xfrm>
+          <a:prstGeom prst="rect">
+            <a:avLst/>
+          </a:prstGeom>
+        </p:spPr>
+      </p:pic>
       <p:sp>
         <p:nvSpPr>
           <p:cNvPr id="10" name="Pfeil: nach rechts 9">
@@ -3913,9 +4014,9 @@
           <p:nvPr/>
         </p:nvSpPr>
         <p:spPr>
-          <a:xfrm rot="20354123">
-            <a:off x="6633179" y="3281464"/>
-            <a:ext cx="834501" cy="669100"/>
+          <a:xfrm rot="19499271">
+            <a:off x="7462028" y="3241328"/>
+            <a:ext cx="670014" cy="531838"/>
           </a:xfrm>
           <a:prstGeom prst="rightArrow">
             <a:avLst/>
@@ -3956,10 +4057,10 @@
       </p:sp>
       <p:pic>
         <p:nvPicPr>
-          <p:cNvPr id="11" name="Grafik 10">
-            <a:extLst>
-              <a:ext uri="{FF2B5EF4-FFF2-40B4-BE49-F238E27FC236}">
-                <a16:creationId xmlns:a16="http://schemas.microsoft.com/office/drawing/2014/main" id="{F9174825-F015-44D4-9D45-AFBB187D2F07}"/>
+          <p:cNvPr id="8" name="Grafik 7">
+            <a:extLst>
+              <a:ext uri="{FF2B5EF4-FFF2-40B4-BE49-F238E27FC236}">
+                <a16:creationId xmlns:a16="http://schemas.microsoft.com/office/drawing/2014/main" id="{224E4810-B775-4D28-BCD0-80D9B1A73188}"/>
               </a:ext>
             </a:extLst>
           </p:cNvPr>
@@ -3969,15 +4070,15 @@
           <p:nvPr/>
         </p:nvPicPr>
         <p:blipFill>
-          <a:blip r:embed="rId3"/>
+          <a:blip r:embed="rId5"/>
           <a:stretch>
             <a:fillRect/>
           </a:stretch>
         </p:blipFill>
         <p:spPr>
-          <a:xfrm>
-            <a:off x="7506848" y="1690688"/>
-            <a:ext cx="4372860" cy="3413972"/>
+          <a:xfrm rot="3691248">
+            <a:off x="3809941" y="3423953"/>
+            <a:ext cx="646232" cy="585267"/>
           </a:xfrm>
           <a:prstGeom prst="rect">
             <a:avLst/>
@@ -3986,10 +4087,10 @@
       </p:pic>
       <p:sp>
         <p:nvSpPr>
-          <p:cNvPr id="12" name="Textfeld 11">
-            <a:extLst>
-              <a:ext uri="{FF2B5EF4-FFF2-40B4-BE49-F238E27FC236}">
-                <a16:creationId xmlns:a16="http://schemas.microsoft.com/office/drawing/2014/main" id="{0C86FDD5-6A1F-4D90-A7C2-E09B0D4197CC}"/>
+          <p:cNvPr id="13" name="Textfeld 12">
+            <a:extLst>
+              <a:ext uri="{FF2B5EF4-FFF2-40B4-BE49-F238E27FC236}">
+                <a16:creationId xmlns:a16="http://schemas.microsoft.com/office/drawing/2014/main" id="{72058455-B54F-464D-B938-E9B8CB4F2F91}"/>
               </a:ext>
             </a:extLst>
           </p:cNvPr>
@@ -3998,8 +4099,8 @@
         </p:nvSpPr>
         <p:spPr>
           <a:xfrm>
-            <a:off x="6051961" y="2932499"/>
-            <a:ext cx="1651247" cy="369332"/>
+            <a:off x="3810773" y="2683482"/>
+            <a:ext cx="1878031" cy="646331"/>
           </a:xfrm>
           <a:prstGeom prst="rect">
             <a:avLst/>
@@ -4014,7 +4115,31 @@
           <a:p>
             <a:r>
               <a:rPr lang="de-DE" dirty="0" err="1"/>
-              <a:t>Normalization</a:t>
+              <a:t>Coloring</a:t>
+            </a:r>
+            <a:r>
+              <a:rPr lang="de-DE" dirty="0"/>
+              <a:t> </a:t>
+            </a:r>
+            <a:r>
+              <a:rPr lang="de-DE" dirty="0" err="1"/>
+              <a:t>according</a:t>
+            </a:r>
+            <a:r>
+              <a:rPr lang="de-DE" dirty="0"/>
+              <a:t> </a:t>
+            </a:r>
+            <a:r>
+              <a:rPr lang="de-DE" dirty="0" err="1"/>
+              <a:t>to</a:t>
+            </a:r>
+            <a:r>
+              <a:rPr lang="de-DE" dirty="0"/>
+              <a:t> </a:t>
+            </a:r>
+            <a:r>
+              <a:rPr lang="de-DE" dirty="0" err="1"/>
+              <a:t>drug</a:t>
             </a:r>
             <a:endParaRPr lang="de-DE" dirty="0"/>
           </a:p>

</xml_diff>